<commit_message>
Fixing the POI template and first lines
</commit_message>
<xml_diff>
--- a/WebContent/WEB-INF/poi.pptx
+++ b/WebContent/WEB-INF/poi.pptx
@@ -289,7 +289,7 @@
             <a:fld id="{1D8BD707-D9CF-40AE-B4C6-C98DA3205C09}" type="datetimeFigureOut">
               <a:rPr lang="en-US" smtClean="0"/>
               <a:pPr/>
-              <a:t>3/20/15</a:t>
+              <a:t>4/10/15</a:t>
             </a:fld>
             <a:endParaRPr lang="en-US"/>
           </a:p>
@@ -456,7 +456,7 @@
             <a:fld id="{1D8BD707-D9CF-40AE-B4C6-C98DA3205C09}" type="datetimeFigureOut">
               <a:rPr lang="en-US" smtClean="0"/>
               <a:pPr/>
-              <a:t>3/20/15</a:t>
+              <a:t>4/10/15</a:t>
             </a:fld>
             <a:endParaRPr lang="en-US"/>
           </a:p>
@@ -633,7 +633,7 @@
             <a:fld id="{1D8BD707-D9CF-40AE-B4C6-C98DA3205C09}" type="datetimeFigureOut">
               <a:rPr lang="en-US" smtClean="0"/>
               <a:pPr/>
-              <a:t>3/20/15</a:t>
+              <a:t>4/10/15</a:t>
             </a:fld>
             <a:endParaRPr lang="en-US"/>
           </a:p>
@@ -800,7 +800,7 @@
             <a:fld id="{1D8BD707-D9CF-40AE-B4C6-C98DA3205C09}" type="datetimeFigureOut">
               <a:rPr lang="en-US" smtClean="0"/>
               <a:pPr/>
-              <a:t>3/20/15</a:t>
+              <a:t>4/10/15</a:t>
             </a:fld>
             <a:endParaRPr lang="en-US"/>
           </a:p>
@@ -1043,7 +1043,7 @@
             <a:fld id="{1D8BD707-D9CF-40AE-B4C6-C98DA3205C09}" type="datetimeFigureOut">
               <a:rPr lang="en-US" smtClean="0"/>
               <a:pPr/>
-              <a:t>3/20/15</a:t>
+              <a:t>4/10/15</a:t>
             </a:fld>
             <a:endParaRPr lang="en-US"/>
           </a:p>
@@ -1328,7 +1328,7 @@
             <a:fld id="{1D8BD707-D9CF-40AE-B4C6-C98DA3205C09}" type="datetimeFigureOut">
               <a:rPr lang="en-US" smtClean="0"/>
               <a:pPr/>
-              <a:t>3/20/15</a:t>
+              <a:t>4/10/15</a:t>
             </a:fld>
             <a:endParaRPr lang="en-US"/>
           </a:p>
@@ -1747,7 +1747,7 @@
             <a:fld id="{1D8BD707-D9CF-40AE-B4C6-C98DA3205C09}" type="datetimeFigureOut">
               <a:rPr lang="en-US" smtClean="0"/>
               <a:pPr/>
-              <a:t>3/20/15</a:t>
+              <a:t>4/10/15</a:t>
             </a:fld>
             <a:endParaRPr lang="en-US"/>
           </a:p>
@@ -1862,7 +1862,7 @@
             <a:fld id="{1D8BD707-D9CF-40AE-B4C6-C98DA3205C09}" type="datetimeFigureOut">
               <a:rPr lang="en-US" smtClean="0"/>
               <a:pPr/>
-              <a:t>3/20/15</a:t>
+              <a:t>4/10/15</a:t>
             </a:fld>
             <a:endParaRPr lang="en-US"/>
           </a:p>
@@ -1954,7 +1954,7 @@
             <a:fld id="{1D8BD707-D9CF-40AE-B4C6-C98DA3205C09}" type="datetimeFigureOut">
               <a:rPr lang="en-US" smtClean="0"/>
               <a:pPr/>
-              <a:t>3/20/15</a:t>
+              <a:t>4/10/15</a:t>
             </a:fld>
             <a:endParaRPr lang="en-US"/>
           </a:p>
@@ -2228,7 +2228,7 @@
             <a:fld id="{1D8BD707-D9CF-40AE-B4C6-C98DA3205C09}" type="datetimeFigureOut">
               <a:rPr lang="en-US" smtClean="0"/>
               <a:pPr/>
-              <a:t>3/20/15</a:t>
+              <a:t>4/10/15</a:t>
             </a:fld>
             <a:endParaRPr lang="en-US"/>
           </a:p>
@@ -2478,7 +2478,7 @@
             <a:fld id="{1D8BD707-D9CF-40AE-B4C6-C98DA3205C09}" type="datetimeFigureOut">
               <a:rPr lang="en-US" smtClean="0"/>
               <a:pPr/>
-              <a:t>3/20/15</a:t>
+              <a:t>4/10/15</a:t>
             </a:fld>
             <a:endParaRPr lang="en-US"/>
           </a:p>
@@ -2688,7 +2688,7 @@
             <a:fld id="{1D8BD707-D9CF-40AE-B4C6-C98DA3205C09}" type="datetimeFigureOut">
               <a:rPr lang="en-US" smtClean="0"/>
               <a:pPr/>
-              <a:t>3/20/15</a:t>
+              <a:t>4/10/15</a:t>
             </a:fld>
             <a:endParaRPr lang="en-US"/>
           </a:p>
@@ -3126,19 +3126,17 @@
               </a:lnSpc>
             </a:pPr>
             <a:r>
-              <a:rPr lang="en-US" sz="3200" b="0" i="0" smtClean="0">
+              <a:rPr lang="en-US" sz="2000" b="0" i="0" dirty="0" err="1" smtClean="0">
                 <a:solidFill>
                   <a:srgbClr val="000000"/>
                 </a:solidFill>
-                <a:latin typeface="Arial"/>
               </a:rPr>
               <a:t>EnglishBhajanMeaning</a:t>
             </a:r>
-            <a:endParaRPr lang="en-US" sz="3200" b="0" i="0" dirty="0">
+            <a:endParaRPr lang="en-US" sz="2000" b="0" i="0" dirty="0">
               <a:solidFill>
                 <a:srgbClr val="000000"/>
               </a:solidFill>
-              <a:latin typeface="Arial"/>
             </a:endParaRPr>
           </a:p>
         </p:txBody>
@@ -3210,7 +3208,7 @@
               </a:lnSpc>
             </a:pPr>
             <a:r>
-              <a:rPr lang="en-US" sz="2000" b="1" i="0" smtClean="0">
+              <a:rPr lang="en-US" sz="2000" b="1" i="0" dirty="0" err="1" smtClean="0">
                 <a:solidFill>
                   <a:srgbClr val="FF0000"/>
                 </a:solidFill>

</xml_diff>